<commit_message>
Actualizando traducción de contraportadas
</commit_message>
<xml_diff>
--- a/documentacion/portada_y_contraportada/CTFG/2-ContraportadaCTFG.pptx
+++ b/documentacion/portada_y_contraportada/CTFG/2-ContraportadaCTFG.pptx
@@ -1158,7 +1158,15 @@
             </a:br>
             <a:r>
               <a:rPr lang="en-US" dirty="0"/>
-              <a:t>A very important aspect that must be considered in web development is the security of the interactions that originate between the client and the server. Being able to expand the functionalities that a tool offers us perfectly represents what could be a work environment where, after the solution has been delivered over time, the client asks us for new functionalities. Being able to provide the tool with security in its transactions and communication with the user is an ideal complementary aspect of the web development carried out in the final degree project. This would greatly benefit future users who are going to use the application. This plugin aims to cover essential fields in the security of the website, such as the tokenization of queries or the protection of access to certain routes of the page. The functionalities offered by the website will also be expanded, implementing an email manager that will help in all interactions with the user and a system capable of dumping data from an Excel file to facilitate the first uses for technicians. A backup system will be developed for the database that will allow the data stored in UAL Inventarium to be recovered with the minimum loss of information.</a:t>
+              <a:t>A very important aspect that must be considered in web development is the security of the interactions that originate between the client and the server. Being able to expand the functionalities that a tool offers us perfectly represents what could be a work environment where, after the solution has been delivered over time, the client asks us for new functionalities. Being able to provide the tool with security in its transactions and communication with the user is an ideal complementary aspect of the web development carried out in the final degree project. This would greatly benefit future users who are going to use the application. This complement aims to cover essential fields in the security of the website, such as the tokenization of queries or the protection of access to certain routes of the page. The functionalities offered by the website will also be expanded, implementing an email manager that will help in all interactions with the user and a system capable of dumping data from an Excel file to facilitate the first uses of the tool </a:t>
+            </a:r>
+            <a:r>
+              <a:rPr lang="en-US"/>
+              <a:t>by the </a:t>
+            </a:r>
+            <a:r>
+              <a:rPr lang="en-US" dirty="0"/>
+              <a:t>technicians. A backup system will be developed for the database that will allow the data stored in UAL Inventarium to be recovered with the minimum loss of information.</a:t>
             </a:r>
           </a:p>
         </p:txBody>

</xml_diff>

<commit_message>
Volviendo light los resúmenes
</commit_message>
<xml_diff>
--- a/documentacion/portada_y_contraportada/CTFG/2-ContraportadaCTFG.pptx
+++ b/documentacion/portada_y_contraportada/CTFG/2-ContraportadaCTFG.pptx
@@ -1148,7 +1148,15 @@
             </a:pPr>
             <a:r>
               <a:rPr lang="es-ES" dirty="0"/>
-              <a:t>Un aspecto muy importante que hay que considerar dentro del desarrollo web es el de la seguridad de las interacciones que se originan entre el cliente y el servidor.  Poder ampliar las funcionalidades que nos ofrece una herramienta representa perfectamente lo que podría ser un entorno de trabajo donde, luego de haber sido entregada la solución al paso del tiempo, el cliente nos pide nuevas funcionalidades.  El poder dotar a la herramienta de seguridad en sus transacciones y de una comunicación con el usuario es un aspecto complementario ideal para el desarrollo web realizado en el trabajo fin de grado. Esto favorecería en gran medida a los futuros usuarios que vayan a utilizar la aplicación. Este complemento pretende cubrir campos esenciales en la seguridad del sitio web como puede ser la tokenización de las consultas o la protección del acceso a determinadas rutas de la página.  También se ampliarán las funcionalidades que ofrece la web, implementando un gestor de correos que ayudara en todas las interacciones con el usuario y un sistema capaz de realizar un volcado de datos desde un archivo Excel para facilitar los primeros usos para los técnicos. Se desarrollará un sistema de copias de seguridad para la base de datos que permitirá poder recuperar los datos almacenados en UAL Inventarium con la menor pérdida de información. </a:t>
+              <a:t>Un aspecto muy importante que hay que considerar dentro del desarrollo web es el de la seguridad de las interacciones que se originan entre el cliente y el servidor. El poder dotar a la herramienta, de seguridad en sus transacciones y de una comunicación con el usuario, es un aspecto complementario ideal para el desarrollo web realizado en el trabajo fin de grado. Este complemento pretende cubrir campos esenciales en la seguridad del sitio web como puede ser la tokenización de las consultas o la protección del acceso a determinadas rutas de la página.  También se ampliarán las funcionalidades que ofrece la web, implementando un gestor de correos que ayudara en todas las interacciones con el usuario y un sistema capaz de realizar un volcado de datos desde un archivo Excel. Se desarrollará un sistema de copias de seguridad para la base </a:t>
+            </a:r>
+            <a:r>
+              <a:rPr lang="es-ES"/>
+              <a:t>de datos, que permitirá, </a:t>
+            </a:r>
+            <a:r>
+              <a:rPr lang="es-ES" dirty="0"/>
+              <a:t>poder recuperar los datos almacenados en UAL Inventarium con la menor pérdida de información. </a:t>
             </a:r>
             <a:br>
               <a:rPr lang="es-ES" dirty="0"/>
@@ -1158,15 +1166,7 @@
             </a:br>
             <a:r>
               <a:rPr lang="en-US" dirty="0"/>
-              <a:t>A very important aspect that must be considered in web development is the security of the interactions that originate between the client and the server. Being able to expand the functionalities that a tool offers us perfectly represents what could be a work environment where, after the solution has been delivered over time, the client asks us for new functionalities. Being able to provide the tool with security in its transactions and communication with the user is an ideal complementary aspect of the web development carried out in the final degree project. This would greatly benefit future users who are going to use the application. This complement aims to cover essential fields in the security of the website, such as the tokenization of queries or the protection of access to certain routes of the page. The functionalities offered by the website will also be expanded, implementing an email manager that will help in all interactions with the user and a system capable of dumping data from an Excel file to facilitate the first uses of the tool </a:t>
-            </a:r>
-            <a:r>
-              <a:rPr lang="en-US"/>
-              <a:t>by the </a:t>
-            </a:r>
-            <a:r>
-              <a:rPr lang="en-US" dirty="0"/>
-              <a:t>technicians. A backup system will be developed for the database that will allow the data stored in UAL Inventarium to be recovered with the minimum loss of information.</a:t>
+              <a:t>A very important aspect that must be considered in web development is the security of the interactions that originate between the client and the server. Being able to provide the tool with security in its transactions and communication with the user is an ideal complementary aspect of the web development carried out in the final degree project. This complement aims to cover essential fields in the security of the website, such as the tokenization of queries or the protection of access to certain routes of the page. The functionalities offered by the website will also be expanded, implementing an email manager that will help in all interactions with the user and a system capable of dumping data from an Excel file. A backup system will be developed for the database that will allow the data stored in UAL Inventarium to be recovered with the minimum loss of information.</a:t>
             </a:r>
           </a:p>
         </p:txBody>

</xml_diff>